<commit_message>
Added notes to slides for presenter. Updated formatting for demo slides
</commit_message>
<xml_diff>
--- a/Presentation/BranchMergeDBCode.pptx
+++ b/Presentation/BranchMergeDBCode.pptx
@@ -638,11 +638,37 @@
           <a:p>
             <a:r>
               <a:rPr lang="en-US" dirty="0" smtClean="0"/>
-              <a:t>Two views, DB stuff together,</a:t>
+              <a:t>What can we do about the issues? First, you can use a shared database. This isn’t recommended because it defeats</a:t>
             </a:r>
             <a:r>
               <a:rPr lang="en-US" baseline="0" dirty="0" smtClean="0"/>
-              <a:t> or all applications stuff together.</a:t>
+              <a:t> the purpose of branching. You will need a shared database somewhere, at some point, to get your code together, but for development branching, you need a separate </a:t>
+            </a:r>
+            <a:r>
+              <a:rPr lang="en-US" baseline="0" dirty="0" err="1" smtClean="0"/>
+              <a:t>db</a:t>
+            </a:r>
+            <a:r>
+              <a:rPr lang="en-US" baseline="0" dirty="0" smtClean="0"/>
+              <a:t> per branch, if not per developer. </a:t>
+            </a:r>
+          </a:p>
+          <a:p>
+            <a:r>
+              <a:rPr lang="en-US" baseline="0" dirty="0" smtClean="0"/>
+              <a:t>Branches shouldn’t exist a long time without merging. Certainly you might have a period of time to complete a feature or idea, but merge this back quickly so that others can get the change. Otherwise, merges and the scripts that might be needed for upgrades become complex. </a:t>
+            </a:r>
+          </a:p>
+          <a:p>
+            <a:r>
+              <a:rPr lang="en-US" baseline="0" dirty="0" smtClean="0"/>
+              <a:t>Communication between people is key. Whether you have a DBA doing development changes, or individual front end developers, communicate schema changes.</a:t>
+            </a:r>
+          </a:p>
+          <a:p>
+            <a:r>
+              <a:rPr lang="en-US" baseline="0" dirty="0" smtClean="0"/>
+              <a:t>You will need sample data scripts that can be shared, otherwise this becomes a hassle.</a:t>
             </a:r>
             <a:endParaRPr lang="en-US" dirty="0"/>
           </a:p>
@@ -665,7 +691,7 @@
           <a:p>
             <a:fld id="{E332A5C1-A9B8-4707-ACEF-98CB367ABD38}" type="slidenum">
               <a:rPr lang="en-US" smtClean="0"/>
-              <a:t>19</a:t>
+              <a:t>16</a:t>
             </a:fld>
             <a:endParaRPr lang="en-US"/>
           </a:p>
@@ -674,7 +700,7 @@
     </p:spTree>
     <p:extLst>
       <p:ext uri="{BB962C8B-B14F-4D97-AF65-F5344CB8AC3E}">
-        <p14:creationId xmlns:p14="http://schemas.microsoft.com/office/powerpoint/2010/main" val="407951254"/>
+        <p14:creationId xmlns:p14="http://schemas.microsoft.com/office/powerpoint/2010/main" val="4077472175"/>
       </p:ext>
     </p:extLst>
   </p:cSld>
@@ -730,7 +756,32 @@
           <a:p>
             <a:r>
               <a:rPr lang="en-US" dirty="0" smtClean="0"/>
-              <a:t>Database problems with having table alters in two places.</a:t>
+              <a:t>What does this normally look like in a VCS. Here’s how multiple</a:t>
+            </a:r>
+            <a:r>
+              <a:rPr lang="en-US" baseline="0" dirty="0" smtClean="0"/>
+              <a:t> apps look.</a:t>
+            </a:r>
+          </a:p>
+          <a:p>
+            <a:endParaRPr lang="en-US" dirty="0" smtClean="0"/>
+          </a:p>
+          <a:p>
+            <a:r>
+              <a:rPr lang="en-US" dirty="0" smtClean="0"/>
+              <a:t>Image:</a:t>
+            </a:r>
+            <a:r>
+              <a:rPr lang="en-US" baseline="0" dirty="0" smtClean="0"/>
+              <a:t> </a:t>
+            </a:r>
+            <a:r>
+              <a:rPr lang="en-US" dirty="0" smtClean="0"/>
+              <a:t>http</a:t>
+            </a:r>
+            <a:r>
+              <a:rPr lang="en-US" dirty="0" smtClean="0"/>
+              <a:t>://svnbook.red-bean.com/en/1.6/images/ch04dia3.png</a:t>
             </a:r>
             <a:endParaRPr lang="en-US" dirty="0"/>
           </a:p>
@@ -753,7 +804,7 @@
           <a:p>
             <a:fld id="{E332A5C1-A9B8-4707-ACEF-98CB367ABD38}" type="slidenum">
               <a:rPr lang="en-US" smtClean="0"/>
-              <a:t>21</a:t>
+              <a:t>17</a:t>
             </a:fld>
             <a:endParaRPr lang="en-US"/>
           </a:p>
@@ -762,7 +813,7 @@
     </p:spTree>
     <p:extLst>
       <p:ext uri="{BB962C8B-B14F-4D97-AF65-F5344CB8AC3E}">
-        <p14:creationId xmlns:p14="http://schemas.microsoft.com/office/powerpoint/2010/main" val="2610162191"/>
+        <p14:creationId xmlns:p14="http://schemas.microsoft.com/office/powerpoint/2010/main" val="1113470866"/>
       </p:ext>
     </p:extLst>
   </p:cSld>
@@ -818,7 +869,11 @@
           <a:p>
             <a:r>
               <a:rPr lang="en-US" dirty="0" smtClean="0"/>
-              <a:t>Database problems with having table alters in two places.</a:t>
+              <a:t>Two views, DB stuff together,</a:t>
+            </a:r>
+            <a:r>
+              <a:rPr lang="en-US" baseline="0" dirty="0" smtClean="0"/>
+              <a:t> or all applications stuff together.</a:t>
             </a:r>
             <a:endParaRPr lang="en-US" dirty="0"/>
           </a:p>
@@ -841,7 +896,7 @@
           <a:p>
             <a:fld id="{E332A5C1-A9B8-4707-ACEF-98CB367ABD38}" type="slidenum">
               <a:rPr lang="en-US" smtClean="0"/>
-              <a:t>24</a:t>
+              <a:t>18</a:t>
             </a:fld>
             <a:endParaRPr lang="en-US"/>
           </a:p>
@@ -850,7 +905,7 @@
     </p:spTree>
     <p:extLst>
       <p:ext uri="{BB962C8B-B14F-4D97-AF65-F5344CB8AC3E}">
-        <p14:creationId xmlns:p14="http://schemas.microsoft.com/office/powerpoint/2010/main" val="2426956326"/>
+        <p14:creationId xmlns:p14="http://schemas.microsoft.com/office/powerpoint/2010/main" val="3295225639"/>
       </p:ext>
     </p:extLst>
   </p:cSld>
@@ -906,7 +961,431 @@
           <a:p>
             <a:r>
               <a:rPr lang="en-US" dirty="0" smtClean="0"/>
-              <a:t>Database problems with having table alters in two places.</a:t>
+              <a:t>I prefer the right side. Keep the </a:t>
+            </a:r>
+            <a:r>
+              <a:rPr lang="en-US" dirty="0" err="1" smtClean="0"/>
+              <a:t>db</a:t>
+            </a:r>
+            <a:r>
+              <a:rPr lang="en-US" dirty="0" smtClean="0"/>
+              <a:t> separate, as it’s only likely your application count</a:t>
+            </a:r>
+            <a:r>
+              <a:rPr lang="en-US" baseline="0" dirty="0" smtClean="0"/>
+              <a:t> will grow.</a:t>
+            </a:r>
+            <a:endParaRPr lang="en-US" dirty="0"/>
+          </a:p>
+        </p:txBody>
+      </p:sp>
+      <p:sp>
+        <p:nvSpPr>
+          <p:cNvPr id="4" name="Slide Number Placeholder 3"/>
+          <p:cNvSpPr>
+            <a:spLocks noGrp="1"/>
+          </p:cNvSpPr>
+          <p:nvPr>
+            <p:ph type="sldNum" sz="quarter" idx="10"/>
+          </p:nvPr>
+        </p:nvSpPr>
+        <p:spPr/>
+        <p:txBody>
+          <a:bodyPr/>
+          <a:lstStyle/>
+          <a:p>
+            <a:fld id="{E332A5C1-A9B8-4707-ACEF-98CB367ABD38}" type="slidenum">
+              <a:rPr lang="en-US" smtClean="0"/>
+              <a:t>19</a:t>
+            </a:fld>
+            <a:endParaRPr lang="en-US"/>
+          </a:p>
+        </p:txBody>
+      </p:sp>
+    </p:spTree>
+    <p:extLst>
+      <p:ext uri="{BB962C8B-B14F-4D97-AF65-F5344CB8AC3E}">
+        <p14:creationId xmlns:p14="http://schemas.microsoft.com/office/powerpoint/2010/main" val="407951254"/>
+      </p:ext>
+    </p:extLst>
+  </p:cSld>
+  <p:clrMapOvr>
+    <a:masterClrMapping/>
+  </p:clrMapOvr>
+</p:notes>
+</file>
+
+<file path=ppt/notesSlides/notesSlide14.xml><?xml version="1.0" encoding="utf-8"?>
+<p:notes xmlns:a="http://schemas.openxmlformats.org/drawingml/2006/main" xmlns:r="http://schemas.openxmlformats.org/officeDocument/2006/relationships" xmlns:p="http://schemas.openxmlformats.org/presentationml/2006/main">
+  <p:cSld>
+    <p:spTree>
+      <p:nvGrpSpPr>
+        <p:cNvPr id="1" name=""/>
+        <p:cNvGrpSpPr/>
+        <p:nvPr/>
+      </p:nvGrpSpPr>
+      <p:grpSpPr>
+        <a:xfrm>
+          <a:off x="0" y="0"/>
+          <a:ext cx="0" cy="0"/>
+          <a:chOff x="0" y="0"/>
+          <a:chExt cx="0" cy="0"/>
+        </a:xfrm>
+      </p:grpSpPr>
+      <p:sp>
+        <p:nvSpPr>
+          <p:cNvPr id="2" name="Slide Image Placeholder 1"/>
+          <p:cNvSpPr>
+            <a:spLocks noGrp="1" noRot="1" noChangeAspect="1"/>
+          </p:cNvSpPr>
+          <p:nvPr>
+            <p:ph type="sldImg"/>
+          </p:nvPr>
+        </p:nvSpPr>
+        <p:spPr/>
+      </p:sp>
+      <p:sp>
+        <p:nvSpPr>
+          <p:cNvPr id="3" name="Notes Placeholder 2"/>
+          <p:cNvSpPr>
+            <a:spLocks noGrp="1"/>
+          </p:cNvSpPr>
+          <p:nvPr>
+            <p:ph type="body" idx="1"/>
+          </p:nvPr>
+        </p:nvSpPr>
+        <p:spPr/>
+        <p:txBody>
+          <a:bodyPr/>
+          <a:lstStyle/>
+          <a:p>
+            <a:r>
+              <a:rPr lang="en-US" dirty="0" smtClean="0"/>
+              <a:t>Keep</a:t>
+            </a:r>
+            <a:r>
+              <a:rPr lang="en-US" baseline="0" dirty="0" smtClean="0"/>
+              <a:t> the branches separate from trunk. Whether they’re at the root or below a folder, that’s fine. One thing I’d be sure to do is version data movement scripts as well. </a:t>
+            </a:r>
+            <a:endParaRPr lang="en-US" dirty="0"/>
+          </a:p>
+        </p:txBody>
+      </p:sp>
+      <p:sp>
+        <p:nvSpPr>
+          <p:cNvPr id="4" name="Slide Number Placeholder 3"/>
+          <p:cNvSpPr>
+            <a:spLocks noGrp="1"/>
+          </p:cNvSpPr>
+          <p:nvPr>
+            <p:ph type="sldNum" sz="quarter" idx="10"/>
+          </p:nvPr>
+        </p:nvSpPr>
+        <p:spPr/>
+        <p:txBody>
+          <a:bodyPr/>
+          <a:lstStyle/>
+          <a:p>
+            <a:fld id="{E332A5C1-A9B8-4707-ACEF-98CB367ABD38}" type="slidenum">
+              <a:rPr lang="en-US" smtClean="0"/>
+              <a:t>20</a:t>
+            </a:fld>
+            <a:endParaRPr lang="en-US"/>
+          </a:p>
+        </p:txBody>
+      </p:sp>
+    </p:spTree>
+    <p:extLst>
+      <p:ext uri="{BB962C8B-B14F-4D97-AF65-F5344CB8AC3E}">
+        <p14:creationId xmlns:p14="http://schemas.microsoft.com/office/powerpoint/2010/main" val="1559963019"/>
+      </p:ext>
+    </p:extLst>
+  </p:cSld>
+  <p:clrMapOvr>
+    <a:masterClrMapping/>
+  </p:clrMapOvr>
+</p:notes>
+</file>
+
+<file path=ppt/notesSlides/notesSlide15.xml><?xml version="1.0" encoding="utf-8"?>
+<p:notes xmlns:a="http://schemas.openxmlformats.org/drawingml/2006/main" xmlns:r="http://schemas.openxmlformats.org/officeDocument/2006/relationships" xmlns:p="http://schemas.openxmlformats.org/presentationml/2006/main">
+  <p:cSld>
+    <p:spTree>
+      <p:nvGrpSpPr>
+        <p:cNvPr id="1" name=""/>
+        <p:cNvGrpSpPr/>
+        <p:nvPr/>
+      </p:nvGrpSpPr>
+      <p:grpSpPr>
+        <a:xfrm>
+          <a:off x="0" y="0"/>
+          <a:ext cx="0" cy="0"/>
+          <a:chOff x="0" y="0"/>
+          <a:chExt cx="0" cy="0"/>
+        </a:xfrm>
+      </p:grpSpPr>
+      <p:sp>
+        <p:nvSpPr>
+          <p:cNvPr id="2" name="Slide Image Placeholder 1"/>
+          <p:cNvSpPr>
+            <a:spLocks noGrp="1" noRot="1" noChangeAspect="1"/>
+          </p:cNvSpPr>
+          <p:nvPr>
+            <p:ph type="sldImg"/>
+          </p:nvPr>
+        </p:nvSpPr>
+        <p:spPr/>
+      </p:sp>
+      <p:sp>
+        <p:nvSpPr>
+          <p:cNvPr id="3" name="Notes Placeholder 2"/>
+          <p:cNvSpPr>
+            <a:spLocks noGrp="1"/>
+          </p:cNvSpPr>
+          <p:nvPr>
+            <p:ph type="body" idx="1"/>
+          </p:nvPr>
+        </p:nvSpPr>
+        <p:spPr/>
+        <p:txBody>
+          <a:bodyPr/>
+          <a:lstStyle/>
+          <a:p>
+            <a:r>
+              <a:rPr lang="en-US" dirty="0" smtClean="0"/>
+              <a:t>Demo – show how to make a branch in SVN,</a:t>
+            </a:r>
+            <a:r>
+              <a:rPr lang="en-US" baseline="0" dirty="0" smtClean="0"/>
+              <a:t> copy code. Make changes in two places. Note separation.</a:t>
+            </a:r>
+          </a:p>
+          <a:p>
+            <a:r>
+              <a:rPr lang="en-US" baseline="0" dirty="0" smtClean="0"/>
+              <a:t>Use two databases.</a:t>
+            </a:r>
+          </a:p>
+          <a:p>
+            <a:pPr marL="171450" indent="-171450">
+              <a:buFontTx/>
+              <a:buChar char="-"/>
+            </a:pPr>
+            <a:r>
+              <a:rPr lang="en-US" baseline="0" dirty="0" smtClean="0"/>
+              <a:t>Change two tables</a:t>
+            </a:r>
+          </a:p>
+          <a:p>
+            <a:pPr marL="171450" indent="-171450">
+              <a:buFontTx/>
+              <a:buChar char="-"/>
+            </a:pPr>
+            <a:r>
+              <a:rPr lang="en-US" baseline="0" dirty="0" smtClean="0"/>
+              <a:t>One has no conflicts (add)</a:t>
+            </a:r>
+          </a:p>
+          <a:p>
+            <a:pPr marL="171450" indent="-171450">
+              <a:buFontTx/>
+              <a:buChar char="-"/>
+            </a:pPr>
+            <a:r>
+              <a:rPr lang="en-US" baseline="0" dirty="0" smtClean="0"/>
+              <a:t>One has multiple changes that conflict</a:t>
+            </a:r>
+            <a:endParaRPr lang="en-US" dirty="0"/>
+          </a:p>
+        </p:txBody>
+      </p:sp>
+      <p:sp>
+        <p:nvSpPr>
+          <p:cNvPr id="4" name="Slide Number Placeholder 3"/>
+          <p:cNvSpPr>
+            <a:spLocks noGrp="1"/>
+          </p:cNvSpPr>
+          <p:nvPr>
+            <p:ph type="sldNum" sz="quarter" idx="10"/>
+          </p:nvPr>
+        </p:nvSpPr>
+        <p:spPr/>
+        <p:txBody>
+          <a:bodyPr/>
+          <a:lstStyle/>
+          <a:p>
+            <a:fld id="{E332A5C1-A9B8-4707-ACEF-98CB367ABD38}" type="slidenum">
+              <a:rPr lang="en-US" smtClean="0"/>
+              <a:t>21</a:t>
+            </a:fld>
+            <a:endParaRPr lang="en-US"/>
+          </a:p>
+        </p:txBody>
+      </p:sp>
+    </p:spTree>
+    <p:extLst>
+      <p:ext uri="{BB962C8B-B14F-4D97-AF65-F5344CB8AC3E}">
+        <p14:creationId xmlns:p14="http://schemas.microsoft.com/office/powerpoint/2010/main" val="2610162191"/>
+      </p:ext>
+    </p:extLst>
+  </p:cSld>
+  <p:clrMapOvr>
+    <a:masterClrMapping/>
+  </p:clrMapOvr>
+</p:notes>
+</file>
+
+<file path=ppt/notesSlides/notesSlide16.xml><?xml version="1.0" encoding="utf-8"?>
+<p:notes xmlns:a="http://schemas.openxmlformats.org/drawingml/2006/main" xmlns:r="http://schemas.openxmlformats.org/officeDocument/2006/relationships" xmlns:p="http://schemas.openxmlformats.org/presentationml/2006/main">
+  <p:cSld>
+    <p:spTree>
+      <p:nvGrpSpPr>
+        <p:cNvPr id="1" name=""/>
+        <p:cNvGrpSpPr/>
+        <p:nvPr/>
+      </p:nvGrpSpPr>
+      <p:grpSpPr>
+        <a:xfrm>
+          <a:off x="0" y="0"/>
+          <a:ext cx="0" cy="0"/>
+          <a:chOff x="0" y="0"/>
+          <a:chExt cx="0" cy="0"/>
+        </a:xfrm>
+      </p:grpSpPr>
+      <p:sp>
+        <p:nvSpPr>
+          <p:cNvPr id="2" name="Slide Image Placeholder 1"/>
+          <p:cNvSpPr>
+            <a:spLocks noGrp="1" noRot="1" noChangeAspect="1"/>
+          </p:cNvSpPr>
+          <p:nvPr>
+            <p:ph type="sldImg"/>
+          </p:nvPr>
+        </p:nvSpPr>
+        <p:spPr/>
+      </p:sp>
+      <p:sp>
+        <p:nvSpPr>
+          <p:cNvPr id="3" name="Notes Placeholder 2"/>
+          <p:cNvSpPr>
+            <a:spLocks noGrp="1"/>
+          </p:cNvSpPr>
+          <p:nvPr>
+            <p:ph type="body" idx="1"/>
+          </p:nvPr>
+        </p:nvSpPr>
+        <p:spPr/>
+        <p:txBody>
+          <a:bodyPr/>
+          <a:lstStyle/>
+          <a:p>
+            <a:r>
+              <a:rPr lang="en-US" dirty="0" smtClean="0"/>
+              <a:t>Merge</a:t>
+            </a:r>
+            <a:r>
+              <a:rPr lang="en-US" baseline="0" dirty="0" smtClean="0"/>
+              <a:t> the previous table changes.</a:t>
+            </a:r>
+            <a:endParaRPr lang="en-US" dirty="0"/>
+          </a:p>
+        </p:txBody>
+      </p:sp>
+      <p:sp>
+        <p:nvSpPr>
+          <p:cNvPr id="4" name="Slide Number Placeholder 3"/>
+          <p:cNvSpPr>
+            <a:spLocks noGrp="1"/>
+          </p:cNvSpPr>
+          <p:nvPr>
+            <p:ph type="sldNum" sz="quarter" idx="10"/>
+          </p:nvPr>
+        </p:nvSpPr>
+        <p:spPr/>
+        <p:txBody>
+          <a:bodyPr/>
+          <a:lstStyle/>
+          <a:p>
+            <a:fld id="{E332A5C1-A9B8-4707-ACEF-98CB367ABD38}" type="slidenum">
+              <a:rPr lang="en-US" smtClean="0"/>
+              <a:t>24</a:t>
+            </a:fld>
+            <a:endParaRPr lang="en-US"/>
+          </a:p>
+        </p:txBody>
+      </p:sp>
+    </p:spTree>
+    <p:extLst>
+      <p:ext uri="{BB962C8B-B14F-4D97-AF65-F5344CB8AC3E}">
+        <p14:creationId xmlns:p14="http://schemas.microsoft.com/office/powerpoint/2010/main" val="2426956326"/>
+      </p:ext>
+    </p:extLst>
+  </p:cSld>
+  <p:clrMapOvr>
+    <a:masterClrMapping/>
+  </p:clrMapOvr>
+</p:notes>
+</file>
+
+<file path=ppt/notesSlides/notesSlide17.xml><?xml version="1.0" encoding="utf-8"?>
+<p:notes xmlns:a="http://schemas.openxmlformats.org/drawingml/2006/main" xmlns:r="http://schemas.openxmlformats.org/officeDocument/2006/relationships" xmlns:p="http://schemas.openxmlformats.org/presentationml/2006/main">
+  <p:cSld>
+    <p:spTree>
+      <p:nvGrpSpPr>
+        <p:cNvPr id="1" name=""/>
+        <p:cNvGrpSpPr/>
+        <p:nvPr/>
+      </p:nvGrpSpPr>
+      <p:grpSpPr>
+        <a:xfrm>
+          <a:off x="0" y="0"/>
+          <a:ext cx="0" cy="0"/>
+          <a:chOff x="0" y="0"/>
+          <a:chExt cx="0" cy="0"/>
+        </a:xfrm>
+      </p:grpSpPr>
+      <p:sp>
+        <p:nvSpPr>
+          <p:cNvPr id="2" name="Slide Image Placeholder 1"/>
+          <p:cNvSpPr>
+            <a:spLocks noGrp="1" noRot="1" noChangeAspect="1"/>
+          </p:cNvSpPr>
+          <p:nvPr>
+            <p:ph type="sldImg"/>
+          </p:nvPr>
+        </p:nvSpPr>
+        <p:spPr/>
+      </p:sp>
+      <p:sp>
+        <p:nvSpPr>
+          <p:cNvPr id="3" name="Notes Placeholder 2"/>
+          <p:cNvSpPr>
+            <a:spLocks noGrp="1"/>
+          </p:cNvSpPr>
+          <p:nvPr>
+            <p:ph type="body" idx="1"/>
+          </p:nvPr>
+        </p:nvSpPr>
+        <p:spPr/>
+        <p:txBody>
+          <a:bodyPr/>
+          <a:lstStyle/>
+          <a:p>
+            <a:r>
+              <a:rPr lang="en-US" dirty="0" smtClean="0"/>
+              <a:t>Merge</a:t>
+            </a:r>
+            <a:r>
+              <a:rPr lang="en-US" baseline="0" dirty="0" smtClean="0"/>
+              <a:t> demo for stored procedures. Show changes in two </a:t>
+            </a:r>
+            <a:r>
+              <a:rPr lang="en-US" baseline="0" dirty="0" err="1" smtClean="0"/>
+              <a:t>procs</a:t>
+            </a:r>
+            <a:r>
+              <a:rPr lang="en-US" baseline="0" dirty="0" smtClean="0"/>
+              <a:t>. Make multiple changes. One is non conflicting. One conflicts.</a:t>
             </a:r>
             <a:endParaRPr lang="en-US" dirty="0"/>
           </a:p>
@@ -1544,7 +2023,11 @@
           <a:p>
             <a:r>
               <a:rPr lang="en-US" dirty="0" smtClean="0"/>
-              <a:t>http://svnbook.red-bean.com/en/1.6/images/ch04dia3.png</a:t>
+              <a:t>What</a:t>
+            </a:r>
+            <a:r>
+              <a:rPr lang="en-US" baseline="0" dirty="0" smtClean="0"/>
+              <a:t> happens if I normalize the trunk table in my feature branch? Where does this data go?  For the branch, I can write a script to change this, but the merge back into trunk needs the same data movement.</a:t>
             </a:r>
             <a:endParaRPr lang="en-US" dirty="0"/>
           </a:p>
@@ -1567,7 +2050,7 @@
           <a:p>
             <a:fld id="{E332A5C1-A9B8-4707-ACEF-98CB367ABD38}" type="slidenum">
               <a:rPr lang="en-US" smtClean="0"/>
-              <a:t>17</a:t>
+              <a:t>14</a:t>
             </a:fld>
             <a:endParaRPr lang="en-US"/>
           </a:p>
@@ -1576,7 +2059,7 @@
     </p:spTree>
     <p:extLst>
       <p:ext uri="{BB962C8B-B14F-4D97-AF65-F5344CB8AC3E}">
-        <p14:creationId xmlns:p14="http://schemas.microsoft.com/office/powerpoint/2010/main" val="1113470866"/>
+        <p14:creationId xmlns:p14="http://schemas.microsoft.com/office/powerpoint/2010/main" val="2537944743"/>
       </p:ext>
     </p:extLst>
   </p:cSld>
@@ -1632,11 +2115,11 @@
           <a:p>
             <a:r>
               <a:rPr lang="en-US" dirty="0" smtClean="0"/>
-              <a:t>Two views, DB stuff together,</a:t>
+              <a:t>The reverse</a:t>
             </a:r>
             <a:r>
               <a:rPr lang="en-US" baseline="0" dirty="0" smtClean="0"/>
-              <a:t> or all applications stuff together.</a:t>
+              <a:t> case is also an issue. How do I get this data? Especially true for not null columns, though defaults will usually be enforced here.</a:t>
             </a:r>
             <a:endParaRPr lang="en-US" dirty="0"/>
           </a:p>
@@ -1659,7 +2142,7 @@
           <a:p>
             <a:fld id="{E332A5C1-A9B8-4707-ACEF-98CB367ABD38}" type="slidenum">
               <a:rPr lang="en-US" smtClean="0"/>
-              <a:t>18</a:t>
+              <a:t>15</a:t>
             </a:fld>
             <a:endParaRPr lang="en-US"/>
           </a:p>
@@ -1668,7 +2151,7 @@
     </p:spTree>
     <p:extLst>
       <p:ext uri="{BB962C8B-B14F-4D97-AF65-F5344CB8AC3E}">
-        <p14:creationId xmlns:p14="http://schemas.microsoft.com/office/powerpoint/2010/main" val="3295225639"/>
+        <p14:creationId xmlns:p14="http://schemas.microsoft.com/office/powerpoint/2010/main" val="3695067373"/>
       </p:ext>
     </p:extLst>
   </p:cSld>
@@ -8468,19 +8951,7 @@
           <a:p>
             <a:r>
               <a:rPr lang="en-US" dirty="0" smtClean="0"/>
-              <a:t>Why </a:t>
-            </a:r>
-            <a:r>
-              <a:rPr lang="en-US" dirty="0" smtClean="0"/>
-              <a:t>is</a:t>
-            </a:r>
-            <a:r>
-              <a:rPr lang="en-US" dirty="0" smtClean="0"/>
-              <a:t> </a:t>
-            </a:r>
-            <a:r>
-              <a:rPr lang="en-US" dirty="0" smtClean="0"/>
-              <a:t>this hard?</a:t>
+              <a:t>Why is this hard?</a:t>
             </a:r>
             <a:endParaRPr lang="en-US" dirty="0"/>
           </a:p>
@@ -8584,7 +9055,7 @@
           </p:nvPr>
         </p:nvPicPr>
         <p:blipFill>
-          <a:blip r:embed="rId2">
+          <a:blip r:embed="rId3">
             <a:extLst>
               <a:ext uri="{28A0092B-C50C-407E-A947-70E740481C1C}">
                 <a14:useLocalDpi xmlns:a14="http://schemas.microsoft.com/office/drawing/2010/main" val="0"/>
@@ -8699,7 +9170,7 @@
           <p:nvPr/>
         </p:nvPicPr>
         <p:blipFill>
-          <a:blip r:embed="rId3">
+          <a:blip r:embed="rId4">
             <a:extLst>
               <a:ext uri="{28A0092B-C50C-407E-A947-70E740481C1C}">
                 <a14:useLocalDpi xmlns:a14="http://schemas.microsoft.com/office/drawing/2010/main" val="0"/>
@@ -8910,7 +9381,7 @@
           </p:nvPr>
         </p:nvPicPr>
         <p:blipFill>
-          <a:blip r:embed="rId2">
+          <a:blip r:embed="rId3">
             <a:extLst>
               <a:ext uri="{28A0092B-C50C-407E-A947-70E740481C1C}">
                 <a14:useLocalDpi xmlns:a14="http://schemas.microsoft.com/office/drawing/2010/main" val="0"/>
@@ -9184,7 +9655,7 @@
           <p:nvPr/>
         </p:nvPicPr>
         <p:blipFill>
-          <a:blip r:embed="rId3">
+          <a:blip r:embed="rId4">
             <a:extLst>
               <a:ext uri="{28A0092B-C50C-407E-A947-70E740481C1C}">
                 <a14:useLocalDpi xmlns:a14="http://schemas.microsoft.com/office/drawing/2010/main" val="0"/>
@@ -9282,8 +9753,16 @@
             <a:pPr lvl="1"/>
             <a:r>
               <a:rPr lang="en-US" dirty="0" smtClean="0"/>
-              <a:t>Shared database (not recommended)</a:t>
-            </a:r>
+              <a:t>Dedicated database per branch</a:t>
+            </a:r>
+          </a:p>
+          <a:p>
+            <a:pPr lvl="2"/>
+            <a:r>
+              <a:rPr lang="en-US" dirty="0" smtClean="0"/>
+              <a:t>recommended</a:t>
+            </a:r>
+            <a:endParaRPr lang="en-US" dirty="0" smtClean="0"/>
           </a:p>
           <a:p>
             <a:pPr lvl="1"/>
@@ -9296,8 +9775,27 @@
             <a:pPr lvl="1"/>
             <a:r>
               <a:rPr lang="en-US" dirty="0" smtClean="0"/>
-              <a:t>Good communication</a:t>
-            </a:r>
+              <a:t>Good </a:t>
+            </a:r>
+            <a:r>
+              <a:rPr lang="en-US" dirty="0" smtClean="0"/>
+              <a:t>communication</a:t>
+            </a:r>
+          </a:p>
+          <a:p>
+            <a:pPr lvl="2"/>
+            <a:r>
+              <a:rPr lang="en-US" dirty="0" smtClean="0"/>
+              <a:t>Mostly table changes</a:t>
+            </a:r>
+          </a:p>
+          <a:p>
+            <a:pPr lvl="2"/>
+            <a:r>
+              <a:rPr lang="en-US" dirty="0" smtClean="0"/>
+              <a:t>Maybe views</a:t>
+            </a:r>
+            <a:endParaRPr lang="en-US" dirty="0" smtClean="0"/>
           </a:p>
           <a:p>
             <a:pPr lvl="1"/>
@@ -9978,7 +10476,7 @@
           <p:nvPr/>
         </p:nvPicPr>
         <p:blipFill>
-          <a:blip r:embed="rId2">
+          <a:blip r:embed="rId3">
             <a:extLst>
               <a:ext uri="{28A0092B-C50C-407E-A947-70E740481C1C}">
                 <a14:useLocalDpi xmlns:a14="http://schemas.microsoft.com/office/drawing/2010/main" val="0"/>
@@ -10070,12 +10568,12 @@
         </p:nvSpPr>
         <p:spPr>
           <a:xfrm>
-            <a:off x="381000" y="1905000"/>
+            <a:off x="381000" y="2209800"/>
             <a:ext cx="8229600" cy="1981200"/>
           </a:xfrm>
         </p:spPr>
         <p:txBody>
-          <a:bodyPr/>
+          <a:bodyPr anchor="t"/>
           <a:lstStyle/>
           <a:p>
             <a:pPr marL="0" indent="0">
@@ -10097,28 +10595,7 @@
               </a:rPr>
               <a:t>Setup</a:t>
             </a:r>
-          </a:p>
-          <a:p>
-            <a:pPr marL="0" indent="0">
-              <a:buNone/>
-            </a:pPr>
-            <a:r>
-              <a:rPr lang="en-US" b="1" dirty="0" smtClean="0">
-                <a:solidFill>
-                  <a:schemeClr val="tx1"/>
-                </a:solidFill>
-              </a:rPr>
-              <a:t>Branch </a:t>
-            </a:r>
-            <a:r>
-              <a:rPr lang="en-US" b="1" dirty="0" smtClean="0">
-                <a:solidFill>
-                  <a:schemeClr val="tx1"/>
-                </a:solidFill>
-              </a:rPr>
-              <a:t>Issues</a:t>
-            </a:r>
-            <a:endParaRPr lang="en-US" b="1" dirty="0">
+            <a:endParaRPr lang="en-US" b="1" dirty="0" smtClean="0">
               <a:solidFill>
                 <a:schemeClr val="tx1"/>
               </a:solidFill>
@@ -10789,34 +11266,13 @@
           <a:p>
             <a:r>
               <a:rPr lang="en-US" dirty="0" smtClean="0"/>
-              <a:t>Learn </a:t>
-            </a:r>
+              <a:t>Learn types of branching database code in Version Control Systems</a:t>
+            </a:r>
+          </a:p>
+          <a:p>
             <a:r>
               <a:rPr lang="en-US" dirty="0" smtClean="0"/>
-              <a:t>types</a:t>
-            </a:r>
-            <a:r>
-              <a:rPr lang="en-US" dirty="0" smtClean="0"/>
-              <a:t> </a:t>
-            </a:r>
-            <a:r>
-              <a:rPr lang="en-US" dirty="0" smtClean="0"/>
-              <a:t>of branching database code in Version Control </a:t>
-            </a:r>
-            <a:r>
-              <a:rPr lang="en-US" dirty="0" smtClean="0"/>
-              <a:t>Systems</a:t>
-            </a:r>
-            <a:endParaRPr lang="en-US" dirty="0" smtClean="0"/>
-          </a:p>
-          <a:p>
-            <a:r>
-              <a:rPr lang="en-US" dirty="0" smtClean="0"/>
-              <a:t>Merges for table schema </a:t>
-            </a:r>
-            <a:r>
-              <a:rPr lang="en-US" dirty="0" smtClean="0"/>
-              <a:t>changes</a:t>
+              <a:t>Merges for table schema changes</a:t>
             </a:r>
           </a:p>
           <a:p>
@@ -10824,7 +11280,6 @@
               <a:rPr lang="en-US" dirty="0" smtClean="0"/>
               <a:t>Merges for stored procedure code</a:t>
             </a:r>
-            <a:endParaRPr lang="en-US" dirty="0" smtClean="0"/>
           </a:p>
         </p:txBody>
       </p:sp>
@@ -11552,34 +12007,13 @@
           <a:p>
             <a:r>
               <a:rPr lang="en-US" dirty="0" smtClean="0"/>
-              <a:t>Learn </a:t>
-            </a:r>
+              <a:t>Learn types of branching database code in Version Control Systems</a:t>
+            </a:r>
+          </a:p>
+          <a:p>
             <a:r>
               <a:rPr lang="en-US" dirty="0" smtClean="0"/>
-              <a:t>types</a:t>
-            </a:r>
-            <a:r>
-              <a:rPr lang="en-US" dirty="0" smtClean="0"/>
-              <a:t> </a:t>
-            </a:r>
-            <a:r>
-              <a:rPr lang="en-US" dirty="0" smtClean="0"/>
-              <a:t>of branching database code in Version Control </a:t>
-            </a:r>
-            <a:r>
-              <a:rPr lang="en-US" dirty="0" smtClean="0"/>
-              <a:t>Systems</a:t>
-            </a:r>
-            <a:endParaRPr lang="en-US" dirty="0" smtClean="0"/>
-          </a:p>
-          <a:p>
-            <a:r>
-              <a:rPr lang="en-US" dirty="0" smtClean="0"/>
-              <a:t>Merges for table schema </a:t>
-            </a:r>
-            <a:r>
-              <a:rPr lang="en-US" dirty="0" smtClean="0"/>
-              <a:t>changes</a:t>
+              <a:t>Merges for table schema changes</a:t>
             </a:r>
           </a:p>
           <a:p>
@@ -11587,7 +12021,6 @@
               <a:rPr lang="en-US" dirty="0" smtClean="0"/>
               <a:t>Merges for stored procedure code</a:t>
             </a:r>
-            <a:endParaRPr lang="en-US" dirty="0" smtClean="0"/>
           </a:p>
         </p:txBody>
       </p:sp>
@@ -12326,7 +12759,7 @@
         </p:blipFill>
         <p:spPr>
           <a:xfrm>
-            <a:off x="7467600" y="312337"/>
+            <a:off x="7467600" y="685800"/>
             <a:ext cx="1530429" cy="1511378"/>
           </a:xfrm>
           <a:prstGeom prst="rect">

</xml_diff>

<commit_message>
Fleshed out all demos in outline, changed demos in slides
</commit_message>
<xml_diff>
--- a/Presentation/BranchMergeDBCode.pptx
+++ b/Presentation/BranchMergeDBCode.pptx
@@ -9,7 +9,7 @@
     <p:sldMasterId id="2147483695" r:id="rId5"/>
   </p:sldMasterIdLst>
   <p:notesMasterIdLst>
-    <p:notesMasterId r:id="rId36"/>
+    <p:notesMasterId r:id="rId37"/>
   </p:notesMasterIdLst>
   <p:sldIdLst>
     <p:sldId id="256" r:id="rId6"/>
@@ -33,15 +33,16 @@
     <p:sldId id="310" r:id="rId24"/>
     <p:sldId id="311" r:id="rId25"/>
     <p:sldId id="301" r:id="rId26"/>
-    <p:sldId id="315" r:id="rId27"/>
-    <p:sldId id="316" r:id="rId28"/>
-    <p:sldId id="308" r:id="rId29"/>
-    <p:sldId id="317" r:id="rId30"/>
-    <p:sldId id="309" r:id="rId31"/>
-    <p:sldId id="307" r:id="rId32"/>
-    <p:sldId id="318" r:id="rId33"/>
-    <p:sldId id="260" r:id="rId34"/>
-    <p:sldId id="261" r:id="rId35"/>
+    <p:sldId id="319" r:id="rId27"/>
+    <p:sldId id="315" r:id="rId28"/>
+    <p:sldId id="316" r:id="rId29"/>
+    <p:sldId id="308" r:id="rId30"/>
+    <p:sldId id="317" r:id="rId31"/>
+    <p:sldId id="309" r:id="rId32"/>
+    <p:sldId id="307" r:id="rId33"/>
+    <p:sldId id="318" r:id="rId34"/>
+    <p:sldId id="260" r:id="rId35"/>
+    <p:sldId id="261" r:id="rId36"/>
   </p:sldIdLst>
   <p:sldSz cx="9144000" cy="6858000" type="screen4x3"/>
   <p:notesSz cx="6858000" cy="9144000"/>
@@ -241,7 +242,7 @@
           <a:p>
             <a:fld id="{F2F907C9-8666-45EC-BDB3-62480554DCC1}" type="datetimeFigureOut">
               <a:rPr lang="en-US" smtClean="0"/>
-              <a:t>8/25/2015</a:t>
+              <a:t>9/1/2015</a:t>
             </a:fld>
             <a:endParaRPr lang="en-US"/>
           </a:p>
@@ -1305,7 +1306,7 @@
           <a:p>
             <a:fld id="{E332A5C1-A9B8-4707-ACEF-98CB367ABD38}" type="slidenum">
               <a:rPr lang="en-US" smtClean="0"/>
-              <a:t>24</a:t>
+              <a:t>25</a:t>
             </a:fld>
             <a:endParaRPr lang="en-US"/>
           </a:p>
@@ -1405,7 +1406,7 @@
           <a:p>
             <a:fld id="{E332A5C1-A9B8-4707-ACEF-98CB367ABD38}" type="slidenum">
               <a:rPr lang="en-US" smtClean="0"/>
-              <a:t>26</a:t>
+              <a:t>27</a:t>
             </a:fld>
             <a:endParaRPr lang="en-US"/>
           </a:p>
@@ -3605,7 +3606,7 @@
             <a:fld id="{1D8BD707-D9CF-40AE-B4C6-C98DA3205C09}" type="datetimeFigureOut">
               <a:rPr lang="en-US" smtClean="0"/>
               <a:pPr/>
-              <a:t>8/25/2015</a:t>
+              <a:t>9/1/2015</a:t>
             </a:fld>
             <a:endParaRPr lang="en-US"/>
           </a:p>
@@ -10811,72 +10812,6 @@
       </p:grpSpPr>
       <p:sp>
         <p:nvSpPr>
-          <p:cNvPr id="5" name="Title 4"/>
-          <p:cNvSpPr>
-            <a:spLocks noGrp="1"/>
-          </p:cNvSpPr>
-          <p:nvPr>
-            <p:ph type="title"/>
-          </p:nvPr>
-        </p:nvSpPr>
-        <p:spPr/>
-        <p:txBody>
-          <a:bodyPr/>
-          <a:lstStyle/>
-          <a:p>
-            <a:r>
-              <a:rPr lang="en-US" dirty="0" smtClean="0"/>
-              <a:t>Merging</a:t>
-            </a:r>
-            <a:endParaRPr lang="en-US" dirty="0"/>
-          </a:p>
-        </p:txBody>
-      </p:sp>
-      <p:sp>
-        <p:nvSpPr>
-          <p:cNvPr id="6" name="Content Placeholder 5"/>
-          <p:cNvSpPr>
-            <a:spLocks noGrp="1"/>
-          </p:cNvSpPr>
-          <p:nvPr>
-            <p:ph idx="1"/>
-          </p:nvPr>
-        </p:nvSpPr>
-        <p:spPr/>
-        <p:txBody>
-          <a:bodyPr anchor="t"/>
-          <a:lstStyle/>
-          <a:p>
-            <a:r>
-              <a:rPr lang="en-US" dirty="0" smtClean="0"/>
-              <a:t>Merges are a way to combine code from two developers</a:t>
-            </a:r>
-          </a:p>
-          <a:p>
-            <a:r>
-              <a:rPr lang="en-US" dirty="0" smtClean="0"/>
-              <a:t>Two cases for databases</a:t>
-            </a:r>
-          </a:p>
-          <a:p>
-            <a:pPr lvl="1"/>
-            <a:r>
-              <a:rPr lang="en-US" dirty="0" smtClean="0"/>
-              <a:t>Table code</a:t>
-            </a:r>
-          </a:p>
-          <a:p>
-            <a:pPr lvl="1"/>
-            <a:r>
-              <a:rPr lang="en-US" dirty="0" smtClean="0"/>
-              <a:t>All other schema objects</a:t>
-            </a:r>
-            <a:endParaRPr lang="en-US" dirty="0"/>
-          </a:p>
-        </p:txBody>
-      </p:sp>
-      <p:sp>
-        <p:nvSpPr>
           <p:cNvPr id="4" name="Footer Placeholder 3"/>
           <p:cNvSpPr>
             <a:spLocks noGrp="1"/>
@@ -10901,10 +10836,460 @@
           </a:p>
         </p:txBody>
       </p:sp>
+      <p:sp>
+        <p:nvSpPr>
+          <p:cNvPr id="5" name="Oval 4"/>
+          <p:cNvSpPr/>
+          <p:nvPr/>
+        </p:nvSpPr>
+        <p:spPr>
+          <a:xfrm>
+            <a:off x="1253836" y="1204409"/>
+            <a:ext cx="2057400" cy="1066800"/>
+          </a:xfrm>
+          <a:prstGeom prst="ellipse">
+            <a:avLst/>
+          </a:prstGeom>
+        </p:spPr>
+        <p:style>
+          <a:lnRef idx="1">
+            <a:schemeClr val="accent1"/>
+          </a:lnRef>
+          <a:fillRef idx="3">
+            <a:schemeClr val="accent1"/>
+          </a:fillRef>
+          <a:effectRef idx="2">
+            <a:schemeClr val="accent1"/>
+          </a:effectRef>
+          <a:fontRef idx="minor">
+            <a:schemeClr val="lt1"/>
+          </a:fontRef>
+        </p:style>
+        <p:txBody>
+          <a:bodyPr rtlCol="0" anchor="ctr"/>
+          <a:lstStyle/>
+          <a:p>
+            <a:pPr algn="ctr"/>
+            <a:r>
+              <a:rPr lang="en-US" dirty="0" smtClean="0">
+                <a:solidFill>
+                  <a:srgbClr val="FF0000"/>
+                </a:solidFill>
+              </a:rPr>
+              <a:t>Branch DB</a:t>
+            </a:r>
+            <a:endParaRPr lang="en-US" dirty="0">
+              <a:solidFill>
+                <a:srgbClr val="FF0000"/>
+              </a:solidFill>
+            </a:endParaRPr>
+          </a:p>
+        </p:txBody>
+      </p:sp>
+      <p:sp>
+        <p:nvSpPr>
+          <p:cNvPr id="6" name="Rounded Rectangle 5"/>
+          <p:cNvSpPr/>
+          <p:nvPr/>
+        </p:nvSpPr>
+        <p:spPr>
+          <a:xfrm>
+            <a:off x="5708073" y="881912"/>
+            <a:ext cx="1905000" cy="1905000"/>
+          </a:xfrm>
+          <a:prstGeom prst="roundRect">
+            <a:avLst/>
+          </a:prstGeom>
+        </p:spPr>
+        <p:style>
+          <a:lnRef idx="1">
+            <a:schemeClr val="accent1"/>
+          </a:lnRef>
+          <a:fillRef idx="3">
+            <a:schemeClr val="accent1"/>
+          </a:fillRef>
+          <a:effectRef idx="2">
+            <a:schemeClr val="accent1"/>
+          </a:effectRef>
+          <a:fontRef idx="minor">
+            <a:schemeClr val="lt1"/>
+          </a:fontRef>
+        </p:style>
+        <p:txBody>
+          <a:bodyPr rtlCol="0" anchor="ctr"/>
+          <a:lstStyle/>
+          <a:p>
+            <a:pPr algn="ctr"/>
+            <a:r>
+              <a:rPr lang="en-US" dirty="0" smtClean="0">
+                <a:solidFill>
+                  <a:srgbClr val="FF0000"/>
+                </a:solidFill>
+              </a:rPr>
+              <a:t>VCS Branch</a:t>
+            </a:r>
+            <a:endParaRPr lang="en-US" dirty="0">
+              <a:solidFill>
+                <a:srgbClr val="FF0000"/>
+              </a:solidFill>
+            </a:endParaRPr>
+          </a:p>
+        </p:txBody>
+      </p:sp>
+      <p:sp>
+        <p:nvSpPr>
+          <p:cNvPr id="7" name="Left-Right Arrow 6"/>
+          <p:cNvSpPr/>
+          <p:nvPr/>
+        </p:nvSpPr>
+        <p:spPr>
+          <a:xfrm>
+            <a:off x="3604140" y="1444990"/>
+            <a:ext cx="1753022" cy="486783"/>
+          </a:xfrm>
+          <a:prstGeom prst="leftRightArrow">
+            <a:avLst/>
+          </a:prstGeom>
+        </p:spPr>
+        <p:style>
+          <a:lnRef idx="1">
+            <a:schemeClr val="accent1"/>
+          </a:lnRef>
+          <a:fillRef idx="3">
+            <a:schemeClr val="accent1"/>
+          </a:fillRef>
+          <a:effectRef idx="2">
+            <a:schemeClr val="accent1"/>
+          </a:effectRef>
+          <a:fontRef idx="minor">
+            <a:schemeClr val="lt1"/>
+          </a:fontRef>
+        </p:style>
+        <p:txBody>
+          <a:bodyPr rtlCol="0" anchor="ctr"/>
+          <a:lstStyle/>
+          <a:p>
+            <a:pPr algn="ctr"/>
+            <a:endParaRPr lang="en-US"/>
+          </a:p>
+        </p:txBody>
+      </p:sp>
+      <p:sp>
+        <p:nvSpPr>
+          <p:cNvPr id="8" name="Oval 7"/>
+          <p:cNvSpPr/>
+          <p:nvPr/>
+        </p:nvSpPr>
+        <p:spPr>
+          <a:xfrm>
+            <a:off x="1219200" y="4436929"/>
+            <a:ext cx="2057400" cy="1066800"/>
+          </a:xfrm>
+          <a:prstGeom prst="ellipse">
+            <a:avLst/>
+          </a:prstGeom>
+        </p:spPr>
+        <p:style>
+          <a:lnRef idx="1">
+            <a:schemeClr val="accent1"/>
+          </a:lnRef>
+          <a:fillRef idx="3">
+            <a:schemeClr val="accent1"/>
+          </a:fillRef>
+          <a:effectRef idx="2">
+            <a:schemeClr val="accent1"/>
+          </a:effectRef>
+          <a:fontRef idx="minor">
+            <a:schemeClr val="lt1"/>
+          </a:fontRef>
+        </p:style>
+        <p:txBody>
+          <a:bodyPr rtlCol="0" anchor="ctr"/>
+          <a:lstStyle/>
+          <a:p>
+            <a:pPr algn="ctr"/>
+            <a:r>
+              <a:rPr lang="en-US" dirty="0" smtClean="0">
+                <a:solidFill>
+                  <a:srgbClr val="FF0000"/>
+                </a:solidFill>
+              </a:rPr>
+              <a:t>Trunk DB</a:t>
+            </a:r>
+            <a:endParaRPr lang="en-US" dirty="0">
+              <a:solidFill>
+                <a:srgbClr val="FF0000"/>
+              </a:solidFill>
+            </a:endParaRPr>
+          </a:p>
+        </p:txBody>
+      </p:sp>
+      <p:sp>
+        <p:nvSpPr>
+          <p:cNvPr id="9" name="Rounded Rectangle 8"/>
+          <p:cNvSpPr/>
+          <p:nvPr/>
+        </p:nvSpPr>
+        <p:spPr>
+          <a:xfrm>
+            <a:off x="5708073" y="4011281"/>
+            <a:ext cx="1905000" cy="1905000"/>
+          </a:xfrm>
+          <a:prstGeom prst="roundRect">
+            <a:avLst/>
+          </a:prstGeom>
+        </p:spPr>
+        <p:style>
+          <a:lnRef idx="1">
+            <a:schemeClr val="accent1"/>
+          </a:lnRef>
+          <a:fillRef idx="3">
+            <a:schemeClr val="accent1"/>
+          </a:fillRef>
+          <a:effectRef idx="2">
+            <a:schemeClr val="accent1"/>
+          </a:effectRef>
+          <a:fontRef idx="minor">
+            <a:schemeClr val="lt1"/>
+          </a:fontRef>
+        </p:style>
+        <p:txBody>
+          <a:bodyPr rtlCol="0" anchor="ctr"/>
+          <a:lstStyle/>
+          <a:p>
+            <a:pPr algn="ctr"/>
+            <a:r>
+              <a:rPr lang="en-US" dirty="0" smtClean="0">
+                <a:solidFill>
+                  <a:srgbClr val="FF0000"/>
+                </a:solidFill>
+              </a:rPr>
+              <a:t>VCS Trunk</a:t>
+            </a:r>
+            <a:endParaRPr lang="en-US" dirty="0">
+              <a:solidFill>
+                <a:srgbClr val="FF0000"/>
+              </a:solidFill>
+            </a:endParaRPr>
+          </a:p>
+        </p:txBody>
+      </p:sp>
+      <p:sp>
+        <p:nvSpPr>
+          <p:cNvPr id="10" name="Left-Right Arrow 9"/>
+          <p:cNvSpPr/>
+          <p:nvPr/>
+        </p:nvSpPr>
+        <p:spPr>
+          <a:xfrm>
+            <a:off x="3615825" y="4963781"/>
+            <a:ext cx="1753022" cy="486783"/>
+          </a:xfrm>
+          <a:prstGeom prst="leftRightArrow">
+            <a:avLst/>
+          </a:prstGeom>
+        </p:spPr>
+        <p:style>
+          <a:lnRef idx="1">
+            <a:schemeClr val="accent1"/>
+          </a:lnRef>
+          <a:fillRef idx="3">
+            <a:schemeClr val="accent1"/>
+          </a:fillRef>
+          <a:effectRef idx="2">
+            <a:schemeClr val="accent1"/>
+          </a:effectRef>
+          <a:fontRef idx="minor">
+            <a:schemeClr val="lt1"/>
+          </a:fontRef>
+        </p:style>
+        <p:txBody>
+          <a:bodyPr rtlCol="0" anchor="ctr"/>
+          <a:lstStyle/>
+          <a:p>
+            <a:pPr algn="ctr"/>
+            <a:endParaRPr lang="en-US"/>
+          </a:p>
+        </p:txBody>
+      </p:sp>
+      <p:sp>
+        <p:nvSpPr>
+          <p:cNvPr id="11" name="Up-Down Arrow 10"/>
+          <p:cNvSpPr/>
+          <p:nvPr/>
+        </p:nvSpPr>
+        <p:spPr>
+          <a:xfrm>
+            <a:off x="6404192" y="2874994"/>
+            <a:ext cx="467663" cy="1136287"/>
+          </a:xfrm>
+          <a:prstGeom prst="upDownArrow">
+            <a:avLst/>
+          </a:prstGeom>
+        </p:spPr>
+        <p:style>
+          <a:lnRef idx="1">
+            <a:schemeClr val="accent1"/>
+          </a:lnRef>
+          <a:fillRef idx="3">
+            <a:schemeClr val="accent1"/>
+          </a:fillRef>
+          <a:effectRef idx="2">
+            <a:schemeClr val="accent1"/>
+          </a:effectRef>
+          <a:fontRef idx="minor">
+            <a:schemeClr val="lt1"/>
+          </a:fontRef>
+        </p:style>
+        <p:txBody>
+          <a:bodyPr rtlCol="0" anchor="ctr"/>
+          <a:lstStyle/>
+          <a:p>
+            <a:pPr algn="ctr"/>
+            <a:endParaRPr lang="en-US"/>
+          </a:p>
+        </p:txBody>
+      </p:sp>
+      <p:sp>
+        <p:nvSpPr>
+          <p:cNvPr id="12" name="TextBox 11"/>
+          <p:cNvSpPr txBox="1"/>
+          <p:nvPr/>
+        </p:nvSpPr>
+        <p:spPr>
+          <a:xfrm>
+            <a:off x="6871855" y="3383074"/>
+            <a:ext cx="990600" cy="369332"/>
+          </a:xfrm>
+          <a:prstGeom prst="rect">
+            <a:avLst/>
+          </a:prstGeom>
+          <a:noFill/>
+        </p:spPr>
+        <p:txBody>
+          <a:bodyPr wrap="square" rtlCol="0">
+            <a:spAutoFit/>
+          </a:bodyPr>
+          <a:lstStyle/>
+          <a:p>
+            <a:r>
+              <a:rPr lang="en-US" dirty="0" smtClean="0"/>
+              <a:t>Merge</a:t>
+            </a:r>
+            <a:endParaRPr lang="en-US" dirty="0"/>
+          </a:p>
+        </p:txBody>
+      </p:sp>
+      <p:sp>
+        <p:nvSpPr>
+          <p:cNvPr id="15" name="TextBox 14"/>
+          <p:cNvSpPr txBox="1"/>
+          <p:nvPr/>
+        </p:nvSpPr>
+        <p:spPr>
+          <a:xfrm>
+            <a:off x="277479" y="3198408"/>
+            <a:ext cx="1676400" cy="369332"/>
+          </a:xfrm>
+          <a:prstGeom prst="rect">
+            <a:avLst/>
+          </a:prstGeom>
+          <a:noFill/>
+        </p:spPr>
+        <p:txBody>
+          <a:bodyPr wrap="square" rtlCol="0">
+            <a:spAutoFit/>
+          </a:bodyPr>
+          <a:lstStyle/>
+          <a:p>
+            <a:r>
+              <a:rPr lang="en-US" dirty="0" smtClean="0"/>
+              <a:t>Developer</a:t>
+            </a:r>
+            <a:endParaRPr lang="en-US" dirty="0"/>
+          </a:p>
+        </p:txBody>
+      </p:sp>
+      <p:sp>
+        <p:nvSpPr>
+          <p:cNvPr id="16" name="Right Arrow 15"/>
+          <p:cNvSpPr/>
+          <p:nvPr/>
+        </p:nvSpPr>
+        <p:spPr>
+          <a:xfrm rot="18151600">
+            <a:off x="781592" y="2478507"/>
+            <a:ext cx="1033248" cy="471494"/>
+          </a:xfrm>
+          <a:prstGeom prst="rightArrow">
+            <a:avLst/>
+          </a:prstGeom>
+        </p:spPr>
+        <p:style>
+          <a:lnRef idx="1">
+            <a:schemeClr val="accent1"/>
+          </a:lnRef>
+          <a:fillRef idx="3">
+            <a:schemeClr val="accent1"/>
+          </a:fillRef>
+          <a:effectRef idx="2">
+            <a:schemeClr val="accent1"/>
+          </a:effectRef>
+          <a:fontRef idx="minor">
+            <a:schemeClr val="lt1"/>
+          </a:fontRef>
+        </p:style>
+        <p:txBody>
+          <a:bodyPr rtlCol="0" anchor="ctr"/>
+          <a:lstStyle/>
+          <a:p>
+            <a:pPr algn="ctr"/>
+            <a:endParaRPr lang="en-US"/>
+          </a:p>
+        </p:txBody>
+      </p:sp>
+      <p:sp>
+        <p:nvSpPr>
+          <p:cNvPr id="17" name="Right Arrow 16"/>
+          <p:cNvSpPr/>
+          <p:nvPr/>
+        </p:nvSpPr>
+        <p:spPr>
+          <a:xfrm rot="3490334">
+            <a:off x="599055" y="3929320"/>
+            <a:ext cx="1033248" cy="471494"/>
+          </a:xfrm>
+          <a:prstGeom prst="rightArrow">
+            <a:avLst/>
+          </a:prstGeom>
+        </p:spPr>
+        <p:style>
+          <a:lnRef idx="1">
+            <a:schemeClr val="accent1"/>
+          </a:lnRef>
+          <a:fillRef idx="3">
+            <a:schemeClr val="accent1"/>
+          </a:fillRef>
+          <a:effectRef idx="2">
+            <a:schemeClr val="accent1"/>
+          </a:effectRef>
+          <a:fontRef idx="minor">
+            <a:schemeClr val="lt1"/>
+          </a:fontRef>
+        </p:style>
+        <p:txBody>
+          <a:bodyPr rtlCol="0" anchor="ctr"/>
+          <a:lstStyle/>
+          <a:p>
+            <a:pPr algn="ctr"/>
+            <a:endParaRPr lang="en-US"/>
+          </a:p>
+        </p:txBody>
+      </p:sp>
     </p:spTree>
     <p:extLst>
       <p:ext uri="{BB962C8B-B14F-4D97-AF65-F5344CB8AC3E}">
-        <p14:creationId xmlns:p14="http://schemas.microsoft.com/office/powerpoint/2010/main" val="391799093"/>
+        <p14:creationId xmlns:p14="http://schemas.microsoft.com/office/powerpoint/2010/main" val="1648173520"/>
       </p:ext>
     </p:extLst>
   </p:cSld>
@@ -10948,7 +11333,7 @@
           <a:p>
             <a:r>
               <a:rPr lang="en-US" dirty="0" smtClean="0"/>
-              <a:t>Merging Table Schemas</a:t>
+              <a:t>Merging</a:t>
             </a:r>
             <a:endParaRPr lang="en-US" dirty="0"/>
           </a:p>
@@ -10971,27 +11356,27 @@
           <a:p>
             <a:r>
               <a:rPr lang="en-US" dirty="0" smtClean="0"/>
-              <a:t>Complex because the data must be preserved</a:t>
+              <a:t>Merges are a way to combine code from two developers</a:t>
+            </a:r>
+          </a:p>
+          <a:p>
+            <a:r>
+              <a:rPr lang="en-US" dirty="0" smtClean="0"/>
+              <a:t>Two cases for databases</a:t>
             </a:r>
           </a:p>
           <a:p>
             <a:pPr lvl="1"/>
             <a:r>
               <a:rPr lang="en-US" dirty="0" smtClean="0"/>
-              <a:t>May require data movement scripts</a:t>
+              <a:t>Table code</a:t>
             </a:r>
           </a:p>
           <a:p>
             <a:pPr lvl="1"/>
             <a:r>
               <a:rPr lang="en-US" dirty="0" smtClean="0"/>
-              <a:t>Often needs some manual intervention</a:t>
-            </a:r>
-          </a:p>
-          <a:p>
-            <a:r>
-              <a:rPr lang="en-US" dirty="0" smtClean="0"/>
-              <a:t>Made easier if the application logic doesn’t depend on column order</a:t>
+              <a:t>All other schema objects</a:t>
             </a:r>
             <a:endParaRPr lang="en-US" dirty="0"/>
           </a:p>
@@ -11026,7 +11411,7 @@
     </p:spTree>
     <p:extLst>
       <p:ext uri="{BB962C8B-B14F-4D97-AF65-F5344CB8AC3E}">
-        <p14:creationId xmlns:p14="http://schemas.microsoft.com/office/powerpoint/2010/main" val="2329894320"/>
+        <p14:creationId xmlns:p14="http://schemas.microsoft.com/office/powerpoint/2010/main" val="391799093"/>
       </p:ext>
     </p:extLst>
   </p:cSld>
@@ -11055,6 +11440,128 @@
       </p:grpSpPr>
       <p:sp>
         <p:nvSpPr>
+          <p:cNvPr id="5" name="Title 4"/>
+          <p:cNvSpPr>
+            <a:spLocks noGrp="1"/>
+          </p:cNvSpPr>
+          <p:nvPr>
+            <p:ph type="title"/>
+          </p:nvPr>
+        </p:nvSpPr>
+        <p:spPr/>
+        <p:txBody>
+          <a:bodyPr/>
+          <a:lstStyle/>
+          <a:p>
+            <a:r>
+              <a:rPr lang="en-US" dirty="0" smtClean="0"/>
+              <a:t>Merging Table Schemas</a:t>
+            </a:r>
+            <a:endParaRPr lang="en-US" dirty="0"/>
+          </a:p>
+        </p:txBody>
+      </p:sp>
+      <p:sp>
+        <p:nvSpPr>
+          <p:cNvPr id="6" name="Content Placeholder 5"/>
+          <p:cNvSpPr>
+            <a:spLocks noGrp="1"/>
+          </p:cNvSpPr>
+          <p:nvPr>
+            <p:ph idx="1"/>
+          </p:nvPr>
+        </p:nvSpPr>
+        <p:spPr/>
+        <p:txBody>
+          <a:bodyPr anchor="t"/>
+          <a:lstStyle/>
+          <a:p>
+            <a:r>
+              <a:rPr lang="en-US" dirty="0" smtClean="0"/>
+              <a:t>Complex because the data must be preserved</a:t>
+            </a:r>
+          </a:p>
+          <a:p>
+            <a:pPr lvl="1"/>
+            <a:r>
+              <a:rPr lang="en-US" dirty="0" smtClean="0"/>
+              <a:t>May require data movement scripts</a:t>
+            </a:r>
+          </a:p>
+          <a:p>
+            <a:pPr lvl="1"/>
+            <a:r>
+              <a:rPr lang="en-US" dirty="0" smtClean="0"/>
+              <a:t>Often needs some manual intervention</a:t>
+            </a:r>
+          </a:p>
+          <a:p>
+            <a:r>
+              <a:rPr lang="en-US" dirty="0" smtClean="0"/>
+              <a:t>Made easier if the application logic doesn’t depend on column order</a:t>
+            </a:r>
+            <a:endParaRPr lang="en-US" dirty="0"/>
+          </a:p>
+        </p:txBody>
+      </p:sp>
+      <p:sp>
+        <p:nvSpPr>
+          <p:cNvPr id="4" name="Footer Placeholder 3"/>
+          <p:cNvSpPr>
+            <a:spLocks noGrp="1"/>
+          </p:cNvSpPr>
+          <p:nvPr>
+            <p:ph type="ftr" sz="quarter" idx="10"/>
+          </p:nvPr>
+        </p:nvSpPr>
+        <p:spPr/>
+        <p:txBody>
+          <a:bodyPr/>
+          <a:lstStyle/>
+          <a:p>
+            <a:pPr>
+              <a:defRPr/>
+            </a:pPr>
+            <a:r>
+              <a:rPr lang="en-US" smtClean="0"/>
+              <a:t>#ITDEVCON</a:t>
+            </a:r>
+            <a:endParaRPr lang="en-US"/>
+          </a:p>
+        </p:txBody>
+      </p:sp>
+    </p:spTree>
+    <p:extLst>
+      <p:ext uri="{BB962C8B-B14F-4D97-AF65-F5344CB8AC3E}">
+        <p14:creationId xmlns:p14="http://schemas.microsoft.com/office/powerpoint/2010/main" val="2329894320"/>
+      </p:ext>
+    </p:extLst>
+  </p:cSld>
+  <p:clrMapOvr>
+    <a:masterClrMapping/>
+  </p:clrMapOvr>
+</p:sld>
+</file>
+
+<file path=ppt/slides/slide25.xml><?xml version="1.0" encoding="utf-8"?>
+<p:sld xmlns:a="http://schemas.openxmlformats.org/drawingml/2006/main" xmlns:r="http://schemas.openxmlformats.org/officeDocument/2006/relationships" xmlns:p="http://schemas.openxmlformats.org/presentationml/2006/main">
+  <p:cSld>
+    <p:spTree>
+      <p:nvGrpSpPr>
+        <p:cNvPr id="1" name=""/>
+        <p:cNvGrpSpPr/>
+        <p:nvPr/>
+      </p:nvGrpSpPr>
+      <p:grpSpPr>
+        <a:xfrm>
+          <a:off x="0" y="0"/>
+          <a:ext cx="0" cy="0"/>
+          <a:chOff x="0" y="0"/>
+          <a:chExt cx="0" cy="0"/>
+        </a:xfrm>
+      </p:grpSpPr>
+      <p:sp>
+        <p:nvSpPr>
           <p:cNvPr id="4" name="Title 3"/>
           <p:cNvSpPr>
             <a:spLocks noGrp="1"/>
@@ -11141,7 +11648,7 @@
 </p:sld>
 </file>
 
-<file path=ppt/slides/slide25.xml><?xml version="1.0" encoding="utf-8"?>
+<file path=ppt/slides/slide26.xml><?xml version="1.0" encoding="utf-8"?>
 <p:sld xmlns:a="http://schemas.openxmlformats.org/drawingml/2006/main" xmlns:r="http://schemas.openxmlformats.org/officeDocument/2006/relationships" xmlns:p="http://schemas.openxmlformats.org/presentationml/2006/main">
   <p:cSld>
     <p:spTree>
@@ -11273,7 +11780,7 @@
 </p:sld>
 </file>
 
-<file path=ppt/slides/slide26.xml><?xml version="1.0" encoding="utf-8"?>
+<file path=ppt/slides/slide27.xml><?xml version="1.0" encoding="utf-8"?>
 <p:sld xmlns:a="http://schemas.openxmlformats.org/drawingml/2006/main" xmlns:r="http://schemas.openxmlformats.org/officeDocument/2006/relationships" xmlns:p="http://schemas.openxmlformats.org/presentationml/2006/main">
   <p:cSld>
     <p:spTree>
@@ -11378,7 +11885,7 @@
 </p:sld>
 </file>
 
-<file path=ppt/slides/slide27.xml><?xml version="1.0" encoding="utf-8"?>
+<file path=ppt/slides/slide28.xml><?xml version="1.0" encoding="utf-8"?>
 <p:sld xmlns:a="http://schemas.openxmlformats.org/drawingml/2006/main" xmlns:r="http://schemas.openxmlformats.org/officeDocument/2006/relationships" xmlns:p="http://schemas.openxmlformats.org/presentationml/2006/main">
   <p:cSld>
     <p:spTree>
@@ -11472,7 +11979,7 @@
 </p:sld>
 </file>
 
-<file path=ppt/slides/slide28.xml><?xml version="1.0" encoding="utf-8"?>
+<file path=ppt/slides/slide29.xml><?xml version="1.0" encoding="utf-8"?>
 <p:sld xmlns:a="http://schemas.openxmlformats.org/drawingml/2006/main" xmlns:r="http://schemas.openxmlformats.org/officeDocument/2006/relationships" xmlns:p="http://schemas.openxmlformats.org/presentationml/2006/main">
   <p:cSld>
     <p:spTree>
@@ -13495,7 +14002,101 @@
 </p:sld>
 </file>
 
-<file path=ppt/slides/slide29.xml><?xml version="1.0" encoding="utf-8"?>
+<file path=ppt/slides/slide3.xml><?xml version="1.0" encoding="utf-8"?>
+<p:sld xmlns:a="http://schemas.openxmlformats.org/drawingml/2006/main" xmlns:r="http://schemas.openxmlformats.org/officeDocument/2006/relationships" xmlns:p="http://schemas.openxmlformats.org/presentationml/2006/main">
+  <p:cSld>
+    <p:spTree>
+      <p:nvGrpSpPr>
+        <p:cNvPr id="1" name=""/>
+        <p:cNvGrpSpPr/>
+        <p:nvPr/>
+      </p:nvGrpSpPr>
+      <p:grpSpPr>
+        <a:xfrm>
+          <a:off x="0" y="0"/>
+          <a:ext cx="0" cy="0"/>
+          <a:chOff x="0" y="0"/>
+          <a:chExt cx="0" cy="0"/>
+        </a:xfrm>
+      </p:grpSpPr>
+      <p:sp>
+        <p:nvSpPr>
+          <p:cNvPr id="2" name="Title 1"/>
+          <p:cNvSpPr>
+            <a:spLocks noGrp="1"/>
+          </p:cNvSpPr>
+          <p:nvPr>
+            <p:ph type="title"/>
+          </p:nvPr>
+        </p:nvSpPr>
+        <p:spPr/>
+        <p:txBody>
+          <a:bodyPr/>
+          <a:lstStyle/>
+          <a:p>
+            <a:r>
+              <a:rPr lang="en-US" dirty="0" smtClean="0"/>
+              <a:t>Goals</a:t>
+            </a:r>
+            <a:endParaRPr lang="en-US" dirty="0"/>
+          </a:p>
+        </p:txBody>
+      </p:sp>
+      <p:sp>
+        <p:nvSpPr>
+          <p:cNvPr id="3" name="Content Placeholder 2"/>
+          <p:cNvSpPr>
+            <a:spLocks noGrp="1"/>
+          </p:cNvSpPr>
+          <p:nvPr>
+            <p:ph idx="1"/>
+          </p:nvPr>
+        </p:nvSpPr>
+        <p:spPr/>
+        <p:txBody>
+          <a:bodyPr anchor="t"/>
+          <a:lstStyle/>
+          <a:p>
+            <a:r>
+              <a:rPr lang="en-US" dirty="0" smtClean="0"/>
+              <a:t>Learn types of branching database code in Version Control Systems</a:t>
+            </a:r>
+          </a:p>
+          <a:p>
+            <a:r>
+              <a:rPr lang="en-US" dirty="0" smtClean="0"/>
+              <a:t>Merges for table schema changes</a:t>
+            </a:r>
+          </a:p>
+          <a:p>
+            <a:r>
+              <a:rPr lang="en-US" dirty="0" smtClean="0"/>
+              <a:t>Merges for stored procedure code</a:t>
+            </a:r>
+          </a:p>
+        </p:txBody>
+      </p:sp>
+    </p:spTree>
+    <p:extLst>
+      <p:ext uri="{BB962C8B-B14F-4D97-AF65-F5344CB8AC3E}">
+        <p14:creationId xmlns:p14="http://schemas.microsoft.com/office/powerpoint/2010/main" val="1579214034"/>
+      </p:ext>
+    </p:extLst>
+  </p:cSld>
+  <p:clrMapOvr>
+    <a:masterClrMapping/>
+  </p:clrMapOvr>
+  <p:timing>
+    <p:tnLst>
+      <p:par>
+        <p:cTn id="1" dur="indefinite" restart="never" nodeType="tmRoot"/>
+      </p:par>
+    </p:tnLst>
+  </p:timing>
+</p:sld>
+</file>
+
+<file path=ppt/slides/slide30.xml><?xml version="1.0" encoding="utf-8"?>
 <p:sld xmlns:a="http://schemas.openxmlformats.org/drawingml/2006/main" xmlns:r="http://schemas.openxmlformats.org/officeDocument/2006/relationships" xmlns:p="http://schemas.openxmlformats.org/presentationml/2006/main">
   <p:cSld>
     <p:spTree>
@@ -13901,101 +14502,7 @@
 </p:sld>
 </file>
 
-<file path=ppt/slides/slide3.xml><?xml version="1.0" encoding="utf-8"?>
-<p:sld xmlns:a="http://schemas.openxmlformats.org/drawingml/2006/main" xmlns:r="http://schemas.openxmlformats.org/officeDocument/2006/relationships" xmlns:p="http://schemas.openxmlformats.org/presentationml/2006/main">
-  <p:cSld>
-    <p:spTree>
-      <p:nvGrpSpPr>
-        <p:cNvPr id="1" name=""/>
-        <p:cNvGrpSpPr/>
-        <p:nvPr/>
-      </p:nvGrpSpPr>
-      <p:grpSpPr>
-        <a:xfrm>
-          <a:off x="0" y="0"/>
-          <a:ext cx="0" cy="0"/>
-          <a:chOff x="0" y="0"/>
-          <a:chExt cx="0" cy="0"/>
-        </a:xfrm>
-      </p:grpSpPr>
-      <p:sp>
-        <p:nvSpPr>
-          <p:cNvPr id="2" name="Title 1"/>
-          <p:cNvSpPr>
-            <a:spLocks noGrp="1"/>
-          </p:cNvSpPr>
-          <p:nvPr>
-            <p:ph type="title"/>
-          </p:nvPr>
-        </p:nvSpPr>
-        <p:spPr/>
-        <p:txBody>
-          <a:bodyPr/>
-          <a:lstStyle/>
-          <a:p>
-            <a:r>
-              <a:rPr lang="en-US" dirty="0" smtClean="0"/>
-              <a:t>Goals</a:t>
-            </a:r>
-            <a:endParaRPr lang="en-US" dirty="0"/>
-          </a:p>
-        </p:txBody>
-      </p:sp>
-      <p:sp>
-        <p:nvSpPr>
-          <p:cNvPr id="3" name="Content Placeholder 2"/>
-          <p:cNvSpPr>
-            <a:spLocks noGrp="1"/>
-          </p:cNvSpPr>
-          <p:nvPr>
-            <p:ph idx="1"/>
-          </p:nvPr>
-        </p:nvSpPr>
-        <p:spPr/>
-        <p:txBody>
-          <a:bodyPr anchor="t"/>
-          <a:lstStyle/>
-          <a:p>
-            <a:r>
-              <a:rPr lang="en-US" dirty="0" smtClean="0"/>
-              <a:t>Learn types of branching database code in Version Control Systems</a:t>
-            </a:r>
-          </a:p>
-          <a:p>
-            <a:r>
-              <a:rPr lang="en-US" dirty="0" smtClean="0"/>
-              <a:t>Merges for table schema changes</a:t>
-            </a:r>
-          </a:p>
-          <a:p>
-            <a:r>
-              <a:rPr lang="en-US" dirty="0" smtClean="0"/>
-              <a:t>Merges for stored procedure code</a:t>
-            </a:r>
-          </a:p>
-        </p:txBody>
-      </p:sp>
-    </p:spTree>
-    <p:extLst>
-      <p:ext uri="{BB962C8B-B14F-4D97-AF65-F5344CB8AC3E}">
-        <p14:creationId xmlns:p14="http://schemas.microsoft.com/office/powerpoint/2010/main" val="1579214034"/>
-      </p:ext>
-    </p:extLst>
-  </p:cSld>
-  <p:clrMapOvr>
-    <a:masterClrMapping/>
-  </p:clrMapOvr>
-  <p:timing>
-    <p:tnLst>
-      <p:par>
-        <p:cTn id="1" dur="indefinite" restart="never" nodeType="tmRoot"/>
-      </p:par>
-    </p:tnLst>
-  </p:timing>
-</p:sld>
-</file>
-
-<file path=ppt/slides/slide30.xml><?xml version="1.0" encoding="utf-8"?>
+<file path=ppt/slides/slide31.xml><?xml version="1.0" encoding="utf-8"?>
 <p:sld xmlns:a="http://schemas.openxmlformats.org/drawingml/2006/main" xmlns:r="http://schemas.openxmlformats.org/officeDocument/2006/relationships" xmlns:p="http://schemas.openxmlformats.org/presentationml/2006/main">
   <p:cSld>
     <p:spTree>

</xml_diff>